<commit_message>
Update MasterBLASTer flowchart - rough.pptx
</commit_message>
<xml_diff>
--- a/background_docs/MasterBLASTer flowchart - rough.pptx
+++ b/background_docs/MasterBLASTer flowchart - rough.pptx
@@ -254,7 +254,7 @@
           <a:p>
             <a:fld id="{397F0003-8ACE-4AA5-9AB0-8C94329FEF97}" type="datetimeFigureOut">
               <a:rPr lang="en-US" smtClean="0"/>
-              <a:t>5/1/2020</a:t>
+              <a:t>5/20/2020</a:t>
             </a:fld>
             <a:endParaRPr lang="en-US"/>
           </a:p>
@@ -424,7 +424,7 @@
           <a:p>
             <a:fld id="{397F0003-8ACE-4AA5-9AB0-8C94329FEF97}" type="datetimeFigureOut">
               <a:rPr lang="en-US" smtClean="0"/>
-              <a:t>5/1/2020</a:t>
+              <a:t>5/20/2020</a:t>
             </a:fld>
             <a:endParaRPr lang="en-US"/>
           </a:p>
@@ -604,7 +604,7 @@
           <a:p>
             <a:fld id="{397F0003-8ACE-4AA5-9AB0-8C94329FEF97}" type="datetimeFigureOut">
               <a:rPr lang="en-US" smtClean="0"/>
-              <a:t>5/1/2020</a:t>
+              <a:t>5/20/2020</a:t>
             </a:fld>
             <a:endParaRPr lang="en-US"/>
           </a:p>
@@ -774,7 +774,7 @@
           <a:p>
             <a:fld id="{397F0003-8ACE-4AA5-9AB0-8C94329FEF97}" type="datetimeFigureOut">
               <a:rPr lang="en-US" smtClean="0"/>
-              <a:t>5/1/2020</a:t>
+              <a:t>5/20/2020</a:t>
             </a:fld>
             <a:endParaRPr lang="en-US"/>
           </a:p>
@@ -1020,7 +1020,7 @@
           <a:p>
             <a:fld id="{397F0003-8ACE-4AA5-9AB0-8C94329FEF97}" type="datetimeFigureOut">
               <a:rPr lang="en-US" smtClean="0"/>
-              <a:t>5/1/2020</a:t>
+              <a:t>5/20/2020</a:t>
             </a:fld>
             <a:endParaRPr lang="en-US"/>
           </a:p>
@@ -1252,7 +1252,7 @@
           <a:p>
             <a:fld id="{397F0003-8ACE-4AA5-9AB0-8C94329FEF97}" type="datetimeFigureOut">
               <a:rPr lang="en-US" smtClean="0"/>
-              <a:t>5/1/2020</a:t>
+              <a:t>5/20/2020</a:t>
             </a:fld>
             <a:endParaRPr lang="en-US"/>
           </a:p>
@@ -1619,7 +1619,7 @@
           <a:p>
             <a:fld id="{397F0003-8ACE-4AA5-9AB0-8C94329FEF97}" type="datetimeFigureOut">
               <a:rPr lang="en-US" smtClean="0"/>
-              <a:t>5/1/2020</a:t>
+              <a:t>5/20/2020</a:t>
             </a:fld>
             <a:endParaRPr lang="en-US"/>
           </a:p>
@@ -1737,7 +1737,7 @@
           <a:p>
             <a:fld id="{397F0003-8ACE-4AA5-9AB0-8C94329FEF97}" type="datetimeFigureOut">
               <a:rPr lang="en-US" smtClean="0"/>
-              <a:t>5/1/2020</a:t>
+              <a:t>5/20/2020</a:t>
             </a:fld>
             <a:endParaRPr lang="en-US"/>
           </a:p>
@@ -1832,7 +1832,7 @@
           <a:p>
             <a:fld id="{397F0003-8ACE-4AA5-9AB0-8C94329FEF97}" type="datetimeFigureOut">
               <a:rPr lang="en-US" smtClean="0"/>
-              <a:t>5/1/2020</a:t>
+              <a:t>5/20/2020</a:t>
             </a:fld>
             <a:endParaRPr lang="en-US"/>
           </a:p>
@@ -2109,7 +2109,7 @@
           <a:p>
             <a:fld id="{397F0003-8ACE-4AA5-9AB0-8C94329FEF97}" type="datetimeFigureOut">
               <a:rPr lang="en-US" smtClean="0"/>
-              <a:t>5/1/2020</a:t>
+              <a:t>5/20/2020</a:t>
             </a:fld>
             <a:endParaRPr lang="en-US"/>
           </a:p>
@@ -2362,7 +2362,7 @@
           <a:p>
             <a:fld id="{397F0003-8ACE-4AA5-9AB0-8C94329FEF97}" type="datetimeFigureOut">
               <a:rPr lang="en-US" smtClean="0"/>
-              <a:t>5/1/2020</a:t>
+              <a:t>5/20/2020</a:t>
             </a:fld>
             <a:endParaRPr lang="en-US"/>
           </a:p>
@@ -2575,7 +2575,7 @@
           <a:p>
             <a:fld id="{397F0003-8ACE-4AA5-9AB0-8C94329FEF97}" type="datetimeFigureOut">
               <a:rPr lang="en-US" smtClean="0"/>
-              <a:t>5/1/2020</a:t>
+              <a:t>5/20/2020</a:t>
             </a:fld>
             <a:endParaRPr lang="en-US"/>
           </a:p>
@@ -3831,6 +3831,120 @@
           </a:p>
         </p:txBody>
       </p:sp>
+      <p:sp>
+        <p:nvSpPr>
+          <p:cNvPr id="3" name="TextBox 2"/>
+          <p:cNvSpPr txBox="1"/>
+          <p:nvPr/>
+        </p:nvSpPr>
+        <p:spPr>
+          <a:xfrm>
+            <a:off x="855271" y="2235322"/>
+            <a:ext cx="3272434" cy="369332"/>
+          </a:xfrm>
+          <a:prstGeom prst="rect">
+            <a:avLst/>
+          </a:prstGeom>
+          <a:noFill/>
+        </p:spPr>
+        <p:txBody>
+          <a:bodyPr wrap="none" rtlCol="0">
+            <a:spAutoFit/>
+          </a:bodyPr>
+          <a:lstStyle/>
+          <a:p>
+            <a:r>
+              <a:rPr lang="en-US" i="1" dirty="0">
+                <a:solidFill>
+                  <a:srgbClr val="FF0000"/>
+                </a:solidFill>
+              </a:rPr>
+              <a:t>make_subset_DB_from_list_3.py</a:t>
+            </a:r>
+            <a:endParaRPr lang="en-US" i="1" dirty="0">
+              <a:solidFill>
+                <a:srgbClr val="FF0000"/>
+              </a:solidFill>
+            </a:endParaRPr>
+          </a:p>
+        </p:txBody>
+      </p:sp>
+      <p:sp>
+        <p:nvSpPr>
+          <p:cNvPr id="17" name="TextBox 16"/>
+          <p:cNvSpPr txBox="1"/>
+          <p:nvPr/>
+        </p:nvSpPr>
+        <p:spPr>
+          <a:xfrm>
+            <a:off x="8131091" y="2530764"/>
+            <a:ext cx="2116670" cy="369332"/>
+          </a:xfrm>
+          <a:prstGeom prst="rect">
+            <a:avLst/>
+          </a:prstGeom>
+          <a:noFill/>
+        </p:spPr>
+        <p:txBody>
+          <a:bodyPr wrap="none" rtlCol="0">
+            <a:spAutoFit/>
+          </a:bodyPr>
+          <a:lstStyle/>
+          <a:p>
+            <a:r>
+              <a:rPr lang="en-US" dirty="0">
+                <a:solidFill>
+                  <a:srgbClr val="FF0000"/>
+                </a:solidFill>
+              </a:rPr>
+              <a:t>db_to_db_blaster.py</a:t>
+            </a:r>
+            <a:endParaRPr lang="en-US" dirty="0">
+              <a:solidFill>
+                <a:srgbClr val="FF0000"/>
+              </a:solidFill>
+            </a:endParaRPr>
+          </a:p>
+        </p:txBody>
+      </p:sp>
+      <p:sp>
+        <p:nvSpPr>
+          <p:cNvPr id="24" name="TextBox 23"/>
+          <p:cNvSpPr txBox="1"/>
+          <p:nvPr/>
+        </p:nvSpPr>
+        <p:spPr>
+          <a:xfrm>
+            <a:off x="5699039" y="3916220"/>
+            <a:ext cx="3091424" cy="369332"/>
+          </a:xfrm>
+          <a:prstGeom prst="rect">
+            <a:avLst/>
+          </a:prstGeom>
+          <a:noFill/>
+        </p:spPr>
+        <p:txBody>
+          <a:bodyPr wrap="none" rtlCol="0">
+            <a:spAutoFit/>
+          </a:bodyPr>
+          <a:lstStyle/>
+          <a:p>
+            <a:r>
+              <a:rPr lang="en-US" dirty="0">
+                <a:solidFill>
+                  <a:srgbClr val="FF0000"/>
+                </a:solidFill>
+              </a:rPr>
+              <a:t>add_protein_annotations_6.py</a:t>
+            </a:r>
+            <a:endParaRPr lang="en-US" dirty="0">
+              <a:solidFill>
+                <a:srgbClr val="FF0000"/>
+              </a:solidFill>
+            </a:endParaRPr>
+          </a:p>
+        </p:txBody>
+      </p:sp>
     </p:spTree>
     <p:extLst>
       <p:ext uri="{BB962C8B-B14F-4D97-AF65-F5344CB8AC3E}">

</xml_diff>